<commit_message>
add text for financing
</commit_message>
<xml_diff>
--- a/other/hauskauf/data/checklist_hauskauf.pptx
+++ b/other/hauskauf/data/checklist_hauskauf.pptx
@@ -8,7 +8,7 @@
     <p:notesMasterId r:id="rId3"/>
   </p:notesMasterIdLst>
   <p:sldIdLst>
-    <p:sldId id="256" r:id="rId2"/>
+    <p:sldId id="258" r:id="rId2"/>
   </p:sldIdLst>
   <p:sldSz cx="6858000" cy="9906000" type="A4"/>
   <p:notesSz cx="6858000" cy="9144000"/>
@@ -197,7 +197,7 @@
           <a:p>
             <a:fld id="{CA45E8C1-4F9A-3C41-8AE9-649689E60830}" type="datetimeFigureOut">
               <a:rPr lang="de-DE" smtClean="0"/>
-              <a:t>20.10.15</a:t>
+              <a:t>21.10.15</a:t>
             </a:fld>
             <a:endParaRPr lang="de-DE"/>
           </a:p>
@@ -539,7 +539,7 @@
     </p:spTree>
     <p:extLst>
       <p:ext uri="{BB962C8B-B14F-4D97-AF65-F5344CB8AC3E}">
-        <p14:creationId xmlns:p14="http://schemas.microsoft.com/office/powerpoint/2010/main" val="672129367"/>
+        <p14:creationId xmlns:p14="http://schemas.microsoft.com/office/powerpoint/2010/main" val="2122720300"/>
       </p:ext>
     </p:extLst>
   </p:cSld>
@@ -680,7 +680,7 @@
           <a:p>
             <a:fld id="{63895B9C-BF77-A74E-992D-D58DD1CF6355}" type="datetimeFigureOut">
               <a:rPr lang="de-DE" smtClean="0"/>
-              <a:t>20.10.15</a:t>
+              <a:t>21.10.15</a:t>
             </a:fld>
             <a:endParaRPr lang="de-DE"/>
           </a:p>
@@ -850,7 +850,7 @@
           <a:p>
             <a:fld id="{63895B9C-BF77-A74E-992D-D58DD1CF6355}" type="datetimeFigureOut">
               <a:rPr lang="de-DE" smtClean="0"/>
-              <a:t>20.10.15</a:t>
+              <a:t>21.10.15</a:t>
             </a:fld>
             <a:endParaRPr lang="de-DE"/>
           </a:p>
@@ -1030,7 +1030,7 @@
           <a:p>
             <a:fld id="{63895B9C-BF77-A74E-992D-D58DD1CF6355}" type="datetimeFigureOut">
               <a:rPr lang="de-DE" smtClean="0"/>
-              <a:t>20.10.15</a:t>
+              <a:t>21.10.15</a:t>
             </a:fld>
             <a:endParaRPr lang="de-DE"/>
           </a:p>
@@ -1200,7 +1200,7 @@
           <a:p>
             <a:fld id="{63895B9C-BF77-A74E-992D-D58DD1CF6355}" type="datetimeFigureOut">
               <a:rPr lang="de-DE" smtClean="0"/>
-              <a:t>20.10.15</a:t>
+              <a:t>21.10.15</a:t>
             </a:fld>
             <a:endParaRPr lang="de-DE"/>
           </a:p>
@@ -1444,7 +1444,7 @@
           <a:p>
             <a:fld id="{63895B9C-BF77-A74E-992D-D58DD1CF6355}" type="datetimeFigureOut">
               <a:rPr lang="de-DE" smtClean="0"/>
-              <a:t>20.10.15</a:t>
+              <a:t>21.10.15</a:t>
             </a:fld>
             <a:endParaRPr lang="de-DE"/>
           </a:p>
@@ -1676,7 +1676,7 @@
           <a:p>
             <a:fld id="{63895B9C-BF77-A74E-992D-D58DD1CF6355}" type="datetimeFigureOut">
               <a:rPr lang="de-DE" smtClean="0"/>
-              <a:t>20.10.15</a:t>
+              <a:t>21.10.15</a:t>
             </a:fld>
             <a:endParaRPr lang="de-DE"/>
           </a:p>
@@ -2043,7 +2043,7 @@
           <a:p>
             <a:fld id="{63895B9C-BF77-A74E-992D-D58DD1CF6355}" type="datetimeFigureOut">
               <a:rPr lang="de-DE" smtClean="0"/>
-              <a:t>20.10.15</a:t>
+              <a:t>21.10.15</a:t>
             </a:fld>
             <a:endParaRPr lang="de-DE"/>
           </a:p>
@@ -2161,7 +2161,7 @@
           <a:p>
             <a:fld id="{63895B9C-BF77-A74E-992D-D58DD1CF6355}" type="datetimeFigureOut">
               <a:rPr lang="de-DE" smtClean="0"/>
-              <a:t>20.10.15</a:t>
+              <a:t>21.10.15</a:t>
             </a:fld>
             <a:endParaRPr lang="de-DE"/>
           </a:p>
@@ -2256,7 +2256,7 @@
           <a:p>
             <a:fld id="{63895B9C-BF77-A74E-992D-D58DD1CF6355}" type="datetimeFigureOut">
               <a:rPr lang="de-DE" smtClean="0"/>
-              <a:t>20.10.15</a:t>
+              <a:t>21.10.15</a:t>
             </a:fld>
             <a:endParaRPr lang="de-DE"/>
           </a:p>
@@ -2533,7 +2533,7 @@
           <a:p>
             <a:fld id="{63895B9C-BF77-A74E-992D-D58DD1CF6355}" type="datetimeFigureOut">
               <a:rPr lang="de-DE" smtClean="0"/>
-              <a:t>20.10.15</a:t>
+              <a:t>21.10.15</a:t>
             </a:fld>
             <a:endParaRPr lang="de-DE"/>
           </a:p>
@@ -2790,7 +2790,7 @@
           <a:p>
             <a:fld id="{63895B9C-BF77-A74E-992D-D58DD1CF6355}" type="datetimeFigureOut">
               <a:rPr lang="de-DE" smtClean="0"/>
-              <a:t>20.10.15</a:t>
+              <a:t>21.10.15</a:t>
             </a:fld>
             <a:endParaRPr lang="de-DE"/>
           </a:p>
@@ -3003,7 +3003,7 @@
           <a:p>
             <a:fld id="{63895B9C-BF77-A74E-992D-D58DD1CF6355}" type="datetimeFigureOut">
               <a:rPr lang="de-DE" smtClean="0"/>
-              <a:t>20.10.15</a:t>
+              <a:t>21.10.15</a:t>
             </a:fld>
             <a:endParaRPr lang="de-DE"/>
           </a:p>
@@ -3664,77 +3664,48 @@
           </a:p>
         </p:txBody>
       </p:sp>
-      <p:grpSp>
-        <p:nvGrpSpPr>
-          <p:cNvPr id="6" name="Gruppierung 5"/>
-          <p:cNvGrpSpPr/>
+      <p:sp>
+        <p:nvSpPr>
+          <p:cNvPr id="3" name="Rechteck 2"/>
+          <p:cNvSpPr/>
           <p:nvPr/>
-        </p:nvGrpSpPr>
-        <p:grpSpPr>
+        </p:nvSpPr>
+        <p:spPr>
           <a:xfrm>
-            <a:off x="426648" y="1261963"/>
-            <a:ext cx="2880000" cy="551384"/>
-            <a:chOff x="247660" y="1588313"/>
-            <a:chExt cx="2562095" cy="551384"/>
+            <a:off x="426648" y="1274663"/>
+            <a:ext cx="2880000" cy="288000"/>
           </a:xfrm>
-        </p:grpSpPr>
-        <p:sp>
-          <p:nvSpPr>
-            <p:cNvPr id="3" name="Rechteck 2"/>
-            <p:cNvSpPr/>
-            <p:nvPr/>
-          </p:nvSpPr>
-          <p:spPr>
-            <a:xfrm>
-              <a:off x="247660" y="1588313"/>
-              <a:ext cx="2562095" cy="395120"/>
-            </a:xfrm>
-            <a:prstGeom prst="rect">
-              <a:avLst/>
-            </a:prstGeom>
-            <a:solidFill>
-              <a:srgbClr val="50B432"/>
-            </a:solidFill>
-            <a:ln>
-              <a:noFill/>
-            </a:ln>
-          </p:spPr>
-          <p:style>
-            <a:lnRef idx="2">
-              <a:schemeClr val="accent1">
-                <a:shade val="50000"/>
-              </a:schemeClr>
-            </a:lnRef>
-            <a:fillRef idx="1">
-              <a:schemeClr val="accent1"/>
-            </a:fillRef>
-            <a:effectRef idx="0">
-              <a:schemeClr val="accent1"/>
-            </a:effectRef>
-            <a:fontRef idx="minor">
-              <a:schemeClr val="lt1"/>
-            </a:fontRef>
-          </p:style>
-          <p:txBody>
-            <a:bodyPr rtlCol="0" anchor="ctr"/>
-            <a:lstStyle/>
-            <a:p>
-              <a:pPr algn="ctr"/>
-              <a:r>
-                <a:rPr lang="de-DE" dirty="0" smtClean="0">
-                  <a:solidFill>
-                    <a:schemeClr val="tx1">
-                      <a:lumMod val="75000"/>
-                      <a:lumOff val="25000"/>
-                    </a:schemeClr>
-                  </a:solidFill>
-                  <a:latin typeface="Roboto Light" charset="0"/>
-                  <a:ea typeface="Roboto Light" charset="0"/>
-                  <a:cs typeface="Roboto Light" charset="0"/>
-                </a:rPr>
-                <a:t>Die Lage</a:t>
-              </a:r>
-              <a:endParaRPr lang="de-DE" dirty="0">
+          <a:prstGeom prst="rect">
+            <a:avLst/>
+          </a:prstGeom>
+          <a:noFill/>
+          <a:ln>
+            <a:noFill/>
+          </a:ln>
+        </p:spPr>
+        <p:style>
+          <a:lnRef idx="2">
+            <a:schemeClr val="accent1">
+              <a:shade val="50000"/>
+            </a:schemeClr>
+          </a:lnRef>
+          <a:fillRef idx="1">
+            <a:schemeClr val="accent1"/>
+          </a:fillRef>
+          <a:effectRef idx="0">
+            <a:schemeClr val="accent1"/>
+          </a:effectRef>
+          <a:fontRef idx="minor">
+            <a:schemeClr val="lt1"/>
+          </a:fontRef>
+        </p:style>
+        <p:txBody>
+          <a:bodyPr rtlCol="0" anchor="ctr"/>
+          <a:lstStyle/>
+          <a:p>
+            <a:pPr algn="ctr"/>
+            <a:r>
+              <a:rPr lang="de-DE" dirty="0" smtClean="0">
                 <a:solidFill>
                   <a:schemeClr val="tx1">
                     <a:lumMod val="75000"/>
@@ -3744,135 +3715,67 @@
                 <a:latin typeface="Roboto Light" charset="0"/>
                 <a:ea typeface="Roboto Light" charset="0"/>
                 <a:cs typeface="Roboto Light" charset="0"/>
-              </a:endParaRPr>
-            </a:p>
-          </p:txBody>
-        </p:sp>
-        <p:sp>
-          <p:nvSpPr>
-            <p:cNvPr id="4" name="Rechtwinkliges Dreieck 3"/>
-            <p:cNvSpPr/>
-            <p:nvPr/>
-          </p:nvSpPr>
-          <p:spPr>
-            <a:xfrm rot="5400000">
-              <a:off x="2486298" y="1817976"/>
-              <a:ext cx="157998" cy="485443"/>
-            </a:xfrm>
-            <a:prstGeom prst="rtTriangle">
-              <a:avLst/>
-            </a:prstGeom>
-            <a:solidFill>
-              <a:schemeClr val="tx1"/>
-            </a:solidFill>
-            <a:ln>
-              <a:noFill/>
-            </a:ln>
-          </p:spPr>
-          <p:style>
-            <a:lnRef idx="2">
-              <a:schemeClr val="accent1">
-                <a:shade val="50000"/>
-              </a:schemeClr>
-            </a:lnRef>
-            <a:fillRef idx="1">
-              <a:schemeClr val="accent1"/>
-            </a:fillRef>
-            <a:effectRef idx="0">
-              <a:schemeClr val="accent1"/>
-            </a:effectRef>
-            <a:fontRef idx="minor">
-              <a:schemeClr val="lt1"/>
-            </a:fontRef>
-          </p:style>
-          <p:txBody>
-            <a:bodyPr rtlCol="0" anchor="ctr"/>
-            <a:lstStyle/>
-            <a:p>
-              <a:pPr algn="ctr"/>
-              <a:endParaRPr lang="de-DE">
-                <a:solidFill>
-                  <a:schemeClr val="tx1">
-                    <a:lumMod val="75000"/>
-                    <a:lumOff val="25000"/>
-                  </a:schemeClr>
-                </a:solidFill>
-              </a:endParaRPr>
-            </a:p>
-          </p:txBody>
-        </p:sp>
-      </p:grpSp>
-      <p:grpSp>
-        <p:nvGrpSpPr>
-          <p:cNvPr id="44" name="Gruppierung 43"/>
-          <p:cNvGrpSpPr/>
+              </a:rPr>
+              <a:t>Lage</a:t>
+            </a:r>
+            <a:endParaRPr lang="de-DE" dirty="0">
+              <a:solidFill>
+                <a:schemeClr val="tx1">
+                  <a:lumMod val="75000"/>
+                  <a:lumOff val="25000"/>
+                </a:schemeClr>
+              </a:solidFill>
+              <a:latin typeface="Roboto Light" charset="0"/>
+              <a:ea typeface="Roboto Light" charset="0"/>
+              <a:cs typeface="Roboto Light" charset="0"/>
+            </a:endParaRPr>
+          </a:p>
+        </p:txBody>
+      </p:sp>
+      <p:sp>
+        <p:nvSpPr>
+          <p:cNvPr id="45" name="Rechteck 44"/>
+          <p:cNvSpPr/>
           <p:nvPr/>
-        </p:nvGrpSpPr>
-        <p:grpSpPr>
+        </p:nvSpPr>
+        <p:spPr>
           <a:xfrm>
-            <a:off x="3551353" y="3864723"/>
-            <a:ext cx="2880000" cy="551384"/>
-            <a:chOff x="247660" y="1588313"/>
-            <a:chExt cx="2562095" cy="551384"/>
+            <a:off x="3551353" y="3788523"/>
+            <a:ext cx="2880000" cy="288000"/>
           </a:xfrm>
-        </p:grpSpPr>
-        <p:sp>
-          <p:nvSpPr>
-            <p:cNvPr id="45" name="Rechteck 44"/>
-            <p:cNvSpPr/>
-            <p:nvPr/>
-          </p:nvSpPr>
-          <p:spPr>
-            <a:xfrm>
-              <a:off x="247660" y="1588313"/>
-              <a:ext cx="2562095" cy="395120"/>
-            </a:xfrm>
-            <a:prstGeom prst="rect">
-              <a:avLst/>
-            </a:prstGeom>
-            <a:solidFill>
-              <a:srgbClr val="009CDE"/>
-            </a:solidFill>
-            <a:ln>
-              <a:noFill/>
-            </a:ln>
-          </p:spPr>
-          <p:style>
-            <a:lnRef idx="2">
-              <a:schemeClr val="accent1">
-                <a:shade val="50000"/>
-              </a:schemeClr>
-            </a:lnRef>
-            <a:fillRef idx="1">
-              <a:schemeClr val="accent1"/>
-            </a:fillRef>
-            <a:effectRef idx="0">
-              <a:schemeClr val="accent1"/>
-            </a:effectRef>
-            <a:fontRef idx="minor">
-              <a:schemeClr val="lt1"/>
-            </a:fontRef>
-          </p:style>
-          <p:txBody>
-            <a:bodyPr rtlCol="0" anchor="ctr"/>
-            <a:lstStyle/>
-            <a:p>
-              <a:pPr algn="ctr"/>
-              <a:r>
-                <a:rPr lang="de-DE" dirty="0" smtClean="0">
-                  <a:solidFill>
-                    <a:schemeClr val="tx1">
-                      <a:lumMod val="75000"/>
-                      <a:lumOff val="25000"/>
-                    </a:schemeClr>
-                  </a:solidFill>
-                  <a:latin typeface="Roboto Light" charset="0"/>
-                  <a:ea typeface="Roboto Light" charset="0"/>
-                  <a:cs typeface="Roboto Light" charset="0"/>
-                </a:rPr>
-                <a:t>Das Haus</a:t>
-              </a:r>
-              <a:endParaRPr lang="de-DE" dirty="0">
+          <a:prstGeom prst="rect">
+            <a:avLst/>
+          </a:prstGeom>
+          <a:solidFill>
+            <a:schemeClr val="bg1"/>
+          </a:solidFill>
+          <a:ln>
+            <a:noFill/>
+          </a:ln>
+        </p:spPr>
+        <p:style>
+          <a:lnRef idx="2">
+            <a:schemeClr val="accent1">
+              <a:shade val="50000"/>
+            </a:schemeClr>
+          </a:lnRef>
+          <a:fillRef idx="1">
+            <a:schemeClr val="accent1"/>
+          </a:fillRef>
+          <a:effectRef idx="0">
+            <a:schemeClr val="accent1"/>
+          </a:effectRef>
+          <a:fontRef idx="minor">
+            <a:schemeClr val="lt1"/>
+          </a:fontRef>
+        </p:style>
+        <p:txBody>
+          <a:bodyPr rtlCol="0" anchor="ctr"/>
+          <a:lstStyle/>
+          <a:p>
+            <a:pPr algn="ctr"/>
+            <a:r>
+              <a:rPr lang="de-DE" dirty="0" smtClean="0">
                 <a:solidFill>
                   <a:schemeClr val="tx1">
                     <a:lumMod val="75000"/>
@@ -3882,64 +3785,23 @@
                 <a:latin typeface="Roboto Light" charset="0"/>
                 <a:ea typeface="Roboto Light" charset="0"/>
                 <a:cs typeface="Roboto Light" charset="0"/>
-              </a:endParaRPr>
-            </a:p>
-          </p:txBody>
-        </p:sp>
-        <p:sp>
-          <p:nvSpPr>
-            <p:cNvPr id="46" name="Rechtwinkliges Dreieck 45"/>
-            <p:cNvSpPr/>
-            <p:nvPr/>
-          </p:nvSpPr>
-          <p:spPr>
-            <a:xfrm rot="5400000">
-              <a:off x="2486298" y="1817976"/>
-              <a:ext cx="157998" cy="485443"/>
-            </a:xfrm>
-            <a:prstGeom prst="rtTriangle">
-              <a:avLst/>
-            </a:prstGeom>
-            <a:solidFill>
-              <a:schemeClr val="tx1"/>
-            </a:solidFill>
-            <a:ln>
-              <a:noFill/>
-            </a:ln>
-          </p:spPr>
-          <p:style>
-            <a:lnRef idx="2">
-              <a:schemeClr val="accent1">
-                <a:shade val="50000"/>
-              </a:schemeClr>
-            </a:lnRef>
-            <a:fillRef idx="1">
-              <a:schemeClr val="accent1"/>
-            </a:fillRef>
-            <a:effectRef idx="0">
-              <a:schemeClr val="accent1"/>
-            </a:effectRef>
-            <a:fontRef idx="minor">
-              <a:schemeClr val="lt1"/>
-            </a:fontRef>
-          </p:style>
-          <p:txBody>
-            <a:bodyPr rtlCol="0" anchor="ctr"/>
-            <a:lstStyle/>
-            <a:p>
-              <a:pPr algn="ctr"/>
-              <a:endParaRPr lang="de-DE">
-                <a:solidFill>
-                  <a:schemeClr val="tx1">
-                    <a:lumMod val="75000"/>
-                    <a:lumOff val="25000"/>
-                  </a:schemeClr>
-                </a:solidFill>
-              </a:endParaRPr>
-            </a:p>
-          </p:txBody>
-        </p:sp>
-      </p:grpSp>
+              </a:rPr>
+              <a:t>Haus</a:t>
+            </a:r>
+            <a:endParaRPr lang="de-DE" dirty="0">
+              <a:solidFill>
+                <a:schemeClr val="tx1">
+                  <a:lumMod val="75000"/>
+                  <a:lumOff val="25000"/>
+                </a:schemeClr>
+              </a:solidFill>
+              <a:latin typeface="Roboto Light" charset="0"/>
+              <a:ea typeface="Roboto Light" charset="0"/>
+              <a:cs typeface="Roboto Light" charset="0"/>
+            </a:endParaRPr>
+          </a:p>
+        </p:txBody>
+      </p:sp>
       <p:graphicFrame>
         <p:nvGraphicFramePr>
           <p:cNvPr id="8" name="Tabelle 7"/>
@@ -3949,13 +3811,13 @@
           <p:nvPr>
             <p:extLst>
               <p:ext uri="{D42A27DB-BD31-4B8C-83A1-F6EECF244321}">
-                <p14:modId xmlns:p14="http://schemas.microsoft.com/office/powerpoint/2010/main" val="18271387"/>
+                <p14:modId xmlns:p14="http://schemas.microsoft.com/office/powerpoint/2010/main" val="253675242"/>
               </p:ext>
             </p:extLst>
           </p:nvPr>
         </p:nvGraphicFramePr>
         <p:xfrm>
-          <a:off x="441602" y="1829560"/>
+          <a:off x="441602" y="1753360"/>
           <a:ext cx="2888496" cy="1702200"/>
         </p:xfrm>
         <a:graphic>
@@ -4000,18 +3862,7 @@
                           <a:ea typeface="Roboto Light" charset="0"/>
                           <a:cs typeface="Roboto Light" charset="0"/>
                         </a:rPr>
-                        <a:t> </a:t>
-                      </a:r>
-                      <a:r>
-                        <a:rPr lang="de-DE" sz="1100" baseline="0" dirty="0" smtClean="0">
-                          <a:solidFill>
-                            <a:schemeClr val="tx1"/>
-                          </a:solidFill>
-                          <a:latin typeface="Roboto Light" charset="0"/>
-                          <a:ea typeface="Roboto Light" charset="0"/>
-                          <a:cs typeface="Roboto Light" charset="0"/>
-                        </a:rPr>
-                        <a:t>die Lage ansprechend?</a:t>
+                        <a:t> die Lage ansprechend?</a:t>
                       </a:r>
                       <a:endParaRPr lang="de-DE" sz="1100" dirty="0">
                         <a:solidFill>
@@ -5296,77 +5147,50 @@
           </a:graphicData>
         </a:graphic>
       </p:graphicFrame>
-      <p:grpSp>
-        <p:nvGrpSpPr>
-          <p:cNvPr id="47" name="Gruppierung 46"/>
-          <p:cNvGrpSpPr/>
+      <p:sp>
+        <p:nvSpPr>
+          <p:cNvPr id="48" name="Rechteck 47"/>
+          <p:cNvSpPr/>
           <p:nvPr/>
-        </p:nvGrpSpPr>
-        <p:grpSpPr>
+        </p:nvSpPr>
+        <p:spPr>
           <a:xfrm>
-            <a:off x="416165" y="5201500"/>
-            <a:ext cx="2880000" cy="551384"/>
-            <a:chOff x="247660" y="1588313"/>
-            <a:chExt cx="2562095" cy="551384"/>
+            <a:off x="416165" y="5125300"/>
+            <a:ext cx="2880000" cy="288000"/>
           </a:xfrm>
-        </p:grpSpPr>
-        <p:sp>
-          <p:nvSpPr>
-            <p:cNvPr id="48" name="Rechteck 47"/>
-            <p:cNvSpPr/>
-            <p:nvPr/>
-          </p:nvSpPr>
-          <p:spPr>
-            <a:xfrm>
-              <a:off x="247660" y="1588313"/>
-              <a:ext cx="2562095" cy="395120"/>
-            </a:xfrm>
-            <a:prstGeom prst="rect">
-              <a:avLst/>
-            </a:prstGeom>
-            <a:solidFill>
-              <a:srgbClr val="F38201"/>
-            </a:solidFill>
-            <a:ln>
-              <a:noFill/>
-            </a:ln>
-          </p:spPr>
-          <p:style>
-            <a:lnRef idx="2">
-              <a:schemeClr val="accent1">
-                <a:shade val="50000"/>
-              </a:schemeClr>
-            </a:lnRef>
-            <a:fillRef idx="1">
-              <a:schemeClr val="accent1"/>
-            </a:fillRef>
-            <a:effectRef idx="0">
-              <a:schemeClr val="accent1"/>
-            </a:effectRef>
-            <a:fontRef idx="minor">
-              <a:schemeClr val="lt1"/>
-            </a:fontRef>
-          </p:style>
-          <p:txBody>
-            <a:bodyPr rtlCol="0" anchor="ctr"/>
-            <a:lstStyle/>
-            <a:p>
-              <a:pPr algn="ctr"/>
-              <a:r>
-                <a:rPr lang="de-DE" dirty="0" smtClean="0">
-                  <a:solidFill>
-                    <a:schemeClr val="tx1">
-                      <a:lumMod val="75000"/>
-                      <a:lumOff val="25000"/>
-                    </a:schemeClr>
-                  </a:solidFill>
-                  <a:latin typeface="Roboto Light" charset="0"/>
-                  <a:ea typeface="Roboto Light" charset="0"/>
-                  <a:cs typeface="Roboto Light" charset="0"/>
-                </a:rPr>
-                <a:t>Das Grundstück</a:t>
-              </a:r>
-              <a:endParaRPr lang="de-DE" dirty="0">
+          <a:prstGeom prst="rect">
+            <a:avLst/>
+          </a:prstGeom>
+          <a:solidFill>
+            <a:schemeClr val="bg1"/>
+          </a:solidFill>
+          <a:ln>
+            <a:noFill/>
+          </a:ln>
+        </p:spPr>
+        <p:style>
+          <a:lnRef idx="2">
+            <a:schemeClr val="accent1">
+              <a:shade val="50000"/>
+            </a:schemeClr>
+          </a:lnRef>
+          <a:fillRef idx="1">
+            <a:schemeClr val="accent1"/>
+          </a:fillRef>
+          <a:effectRef idx="0">
+            <a:schemeClr val="accent1"/>
+          </a:effectRef>
+          <a:fontRef idx="minor">
+            <a:schemeClr val="lt1"/>
+          </a:fontRef>
+        </p:style>
+        <p:txBody>
+          <a:bodyPr rtlCol="0" anchor="ctr"/>
+          <a:lstStyle/>
+          <a:p>
+            <a:pPr algn="ctr"/>
+            <a:r>
+              <a:rPr lang="de-DE" dirty="0" smtClean="0">
                 <a:solidFill>
                   <a:schemeClr val="tx1">
                     <a:lumMod val="75000"/>
@@ -5376,64 +5200,23 @@
                 <a:latin typeface="Roboto Light" charset="0"/>
                 <a:ea typeface="Roboto Light" charset="0"/>
                 <a:cs typeface="Roboto Light" charset="0"/>
-              </a:endParaRPr>
-            </a:p>
-          </p:txBody>
-        </p:sp>
-        <p:sp>
-          <p:nvSpPr>
-            <p:cNvPr id="49" name="Rechtwinkliges Dreieck 48"/>
-            <p:cNvSpPr/>
-            <p:nvPr/>
-          </p:nvSpPr>
-          <p:spPr>
-            <a:xfrm rot="5400000">
-              <a:off x="2486298" y="1817976"/>
-              <a:ext cx="157998" cy="485443"/>
-            </a:xfrm>
-            <a:prstGeom prst="rtTriangle">
-              <a:avLst/>
-            </a:prstGeom>
-            <a:solidFill>
-              <a:schemeClr val="tx1"/>
-            </a:solidFill>
-            <a:ln>
-              <a:noFill/>
-            </a:ln>
-          </p:spPr>
-          <p:style>
-            <a:lnRef idx="2">
-              <a:schemeClr val="accent1">
-                <a:shade val="50000"/>
-              </a:schemeClr>
-            </a:lnRef>
-            <a:fillRef idx="1">
-              <a:schemeClr val="accent1"/>
-            </a:fillRef>
-            <a:effectRef idx="0">
-              <a:schemeClr val="accent1"/>
-            </a:effectRef>
-            <a:fontRef idx="minor">
-              <a:schemeClr val="lt1"/>
-            </a:fontRef>
-          </p:style>
-          <p:txBody>
-            <a:bodyPr rtlCol="0" anchor="ctr"/>
-            <a:lstStyle/>
-            <a:p>
-              <a:pPr algn="ctr"/>
-              <a:endParaRPr lang="de-DE">
-                <a:solidFill>
-                  <a:schemeClr val="tx1">
-                    <a:lumMod val="75000"/>
-                    <a:lumOff val="25000"/>
-                  </a:schemeClr>
-                </a:solidFill>
-              </a:endParaRPr>
-            </a:p>
-          </p:txBody>
-        </p:sp>
-      </p:grpSp>
+              </a:rPr>
+              <a:t>Grundstück</a:t>
+            </a:r>
+            <a:endParaRPr lang="de-DE" dirty="0">
+              <a:solidFill>
+                <a:schemeClr val="tx1">
+                  <a:lumMod val="75000"/>
+                  <a:lumOff val="25000"/>
+                </a:schemeClr>
+              </a:solidFill>
+              <a:latin typeface="Roboto Light" charset="0"/>
+              <a:ea typeface="Roboto Light" charset="0"/>
+              <a:cs typeface="Roboto Light" charset="0"/>
+            </a:endParaRPr>
+          </a:p>
+        </p:txBody>
+      </p:sp>
       <p:graphicFrame>
         <p:nvGraphicFramePr>
           <p:cNvPr id="50" name="Tabelle 49"/>
@@ -5443,13 +5226,13 @@
           <p:nvPr>
             <p:extLst>
               <p:ext uri="{D42A27DB-BD31-4B8C-83A1-F6EECF244321}">
-                <p14:modId xmlns:p14="http://schemas.microsoft.com/office/powerpoint/2010/main" val="486193682"/>
+                <p14:modId xmlns:p14="http://schemas.microsoft.com/office/powerpoint/2010/main" val="764752999"/>
               </p:ext>
             </p:extLst>
           </p:nvPr>
         </p:nvGraphicFramePr>
         <p:xfrm>
-          <a:off x="450017" y="5766482"/>
+          <a:off x="450017" y="5601382"/>
           <a:ext cx="2888496" cy="864000"/>
         </p:xfrm>
         <a:graphic>
@@ -5483,18 +5266,7 @@
                           <a:ea typeface="Roboto Light" charset="0"/>
                           <a:cs typeface="Roboto Light" charset="0"/>
                         </a:rPr>
-                        <a:t>Wie </a:t>
-                      </a:r>
-                      <a:r>
-                        <a:rPr lang="de-DE" sz="1100" dirty="0" smtClean="0">
-                          <a:solidFill>
-                            <a:schemeClr val="tx1"/>
-                          </a:solidFill>
-                          <a:latin typeface="Roboto Light" charset="0"/>
-                          <a:ea typeface="Roboto Light" charset="0"/>
-                          <a:cs typeface="Roboto Light" charset="0"/>
-                        </a:rPr>
-                        <a:t>ist die Ausstattung?</a:t>
+                        <a:t>Wie ist die Ausstattung?</a:t>
                       </a:r>
                       <a:endParaRPr lang="de-DE" sz="1100" dirty="0">
                         <a:solidFill>
@@ -6415,13 +6187,13 @@
           <p:nvPr>
             <p:extLst>
               <p:ext uri="{D42A27DB-BD31-4B8C-83A1-F6EECF244321}">
-                <p14:modId xmlns:p14="http://schemas.microsoft.com/office/powerpoint/2010/main" val="1106462590"/>
+                <p14:modId xmlns:p14="http://schemas.microsoft.com/office/powerpoint/2010/main" val="514026898"/>
               </p:ext>
             </p:extLst>
           </p:nvPr>
         </p:nvGraphicFramePr>
         <p:xfrm>
-          <a:off x="443818" y="6690294"/>
+          <a:off x="443818" y="6525194"/>
           <a:ext cx="2888496" cy="1773120"/>
         </p:xfrm>
         <a:graphic>
@@ -6455,18 +6227,7 @@
                           <a:ea typeface="Roboto Light" charset="0"/>
                           <a:cs typeface="Roboto Light" charset="0"/>
                         </a:rPr>
-                        <a:t>Größe </a:t>
-                      </a:r>
-                      <a:r>
-                        <a:rPr lang="de-DE" sz="1100" dirty="0" smtClean="0">
-                          <a:solidFill>
-                            <a:schemeClr val="tx1"/>
-                          </a:solidFill>
-                          <a:latin typeface="Roboto Light" charset="0"/>
-                          <a:ea typeface="Roboto Light" charset="0"/>
-                          <a:cs typeface="Roboto Light" charset="0"/>
-                        </a:rPr>
-                        <a:t>&amp;</a:t>
+                        <a:t>Größe &amp;</a:t>
                       </a:r>
                       <a:r>
                         <a:rPr lang="de-DE" sz="1100" baseline="0" dirty="0" smtClean="0">
@@ -7800,13 +7561,13 @@
           <p:nvPr>
             <p:extLst>
               <p:ext uri="{D42A27DB-BD31-4B8C-83A1-F6EECF244321}">
-                <p14:modId xmlns:p14="http://schemas.microsoft.com/office/powerpoint/2010/main" val="290423161"/>
+                <p14:modId xmlns:p14="http://schemas.microsoft.com/office/powerpoint/2010/main" val="2070846452"/>
               </p:ext>
             </p:extLst>
           </p:nvPr>
         </p:nvGraphicFramePr>
         <p:xfrm>
-          <a:off x="443818" y="3641335"/>
+          <a:off x="443818" y="3565135"/>
           <a:ext cx="2888496" cy="1512000"/>
         </p:xfrm>
         <a:graphic>
@@ -7841,18 +7602,7 @@
                           <a:ea typeface="Roboto Light" charset="0"/>
                           <a:cs typeface="Roboto Light" charset="0"/>
                         </a:rPr>
-                        <a:t>Ist </a:t>
-                      </a:r>
-                      <a:r>
-                        <a:rPr lang="de-DE" sz="1100" b="1" kern="1200" dirty="0" smtClean="0">
-                          <a:solidFill>
-                            <a:schemeClr val="tx1"/>
-                          </a:solidFill>
-                          <a:latin typeface="Roboto Light" charset="0"/>
-                          <a:ea typeface="Roboto Light" charset="0"/>
-                          <a:cs typeface="Roboto Light" charset="0"/>
-                        </a:rPr>
-                        <a:t>die Infrastruktur gut?</a:t>
+                        <a:t>Ist die Infrastruktur gut?</a:t>
                       </a:r>
                       <a:endParaRPr lang="de-DE" sz="1100" b="1" kern="1200" dirty="0">
                         <a:solidFill>
@@ -9263,77 +9013,50 @@
           </a:graphicData>
         </a:graphic>
       </p:graphicFrame>
-      <p:grpSp>
-        <p:nvGrpSpPr>
-          <p:cNvPr id="53" name="Gruppierung 52"/>
-          <p:cNvGrpSpPr/>
+      <p:sp>
+        <p:nvSpPr>
+          <p:cNvPr id="54" name="Rechteck 53"/>
+          <p:cNvSpPr/>
           <p:nvPr/>
-        </p:nvGrpSpPr>
-        <p:grpSpPr>
+        </p:nvSpPr>
+        <p:spPr>
           <a:xfrm>
-            <a:off x="3552684" y="1263296"/>
-            <a:ext cx="2880000" cy="551384"/>
-            <a:chOff x="247660" y="1588313"/>
-            <a:chExt cx="2562095" cy="551384"/>
+            <a:off x="3552684" y="1275996"/>
+            <a:ext cx="2880000" cy="288000"/>
           </a:xfrm>
-        </p:grpSpPr>
-        <p:sp>
-          <p:nvSpPr>
-            <p:cNvPr id="54" name="Rechteck 53"/>
-            <p:cNvSpPr/>
-            <p:nvPr/>
-          </p:nvSpPr>
-          <p:spPr>
-            <a:xfrm>
-              <a:off x="247660" y="1588313"/>
-              <a:ext cx="2562095" cy="395120"/>
-            </a:xfrm>
-            <a:prstGeom prst="rect">
-              <a:avLst/>
-            </a:prstGeom>
-            <a:solidFill>
-              <a:srgbClr val="B2AB12"/>
-            </a:solidFill>
-            <a:ln>
-              <a:noFill/>
-            </a:ln>
-          </p:spPr>
-          <p:style>
-            <a:lnRef idx="2">
-              <a:schemeClr val="accent1">
-                <a:shade val="50000"/>
-              </a:schemeClr>
-            </a:lnRef>
-            <a:fillRef idx="1">
-              <a:schemeClr val="accent1"/>
-            </a:fillRef>
-            <a:effectRef idx="0">
-              <a:schemeClr val="accent1"/>
-            </a:effectRef>
-            <a:fontRef idx="minor">
-              <a:schemeClr val="lt1"/>
-            </a:fontRef>
-          </p:style>
-          <p:txBody>
-            <a:bodyPr rtlCol="0" anchor="ctr"/>
-            <a:lstStyle/>
-            <a:p>
-              <a:pPr algn="ctr"/>
-              <a:r>
-                <a:rPr lang="de-DE" dirty="0" smtClean="0">
-                  <a:solidFill>
-                    <a:schemeClr val="tx1">
-                      <a:lumMod val="75000"/>
-                      <a:lumOff val="25000"/>
-                    </a:schemeClr>
-                  </a:solidFill>
-                  <a:latin typeface="Roboto Light" charset="0"/>
-                  <a:ea typeface="Roboto Light" charset="0"/>
-                  <a:cs typeface="Roboto Light" charset="0"/>
-                </a:rPr>
-                <a:t>Die Nachbarn</a:t>
-              </a:r>
-              <a:endParaRPr lang="de-DE" dirty="0">
+          <a:prstGeom prst="rect">
+            <a:avLst/>
+          </a:prstGeom>
+          <a:solidFill>
+            <a:schemeClr val="bg1"/>
+          </a:solidFill>
+          <a:ln>
+            <a:noFill/>
+          </a:ln>
+        </p:spPr>
+        <p:style>
+          <a:lnRef idx="2">
+            <a:schemeClr val="accent1">
+              <a:shade val="50000"/>
+            </a:schemeClr>
+          </a:lnRef>
+          <a:fillRef idx="1">
+            <a:schemeClr val="accent1"/>
+          </a:fillRef>
+          <a:effectRef idx="0">
+            <a:schemeClr val="accent1"/>
+          </a:effectRef>
+          <a:fontRef idx="minor">
+            <a:schemeClr val="lt1"/>
+          </a:fontRef>
+        </p:style>
+        <p:txBody>
+          <a:bodyPr rtlCol="0" anchor="ctr"/>
+          <a:lstStyle/>
+          <a:p>
+            <a:pPr algn="ctr"/>
+            <a:r>
+              <a:rPr lang="de-DE" dirty="0" smtClean="0">
                 <a:solidFill>
                   <a:schemeClr val="tx1">
                     <a:lumMod val="75000"/>
@@ -9343,64 +9066,23 @@
                 <a:latin typeface="Roboto Light" charset="0"/>
                 <a:ea typeface="Roboto Light" charset="0"/>
                 <a:cs typeface="Roboto Light" charset="0"/>
-              </a:endParaRPr>
-            </a:p>
-          </p:txBody>
-        </p:sp>
-        <p:sp>
-          <p:nvSpPr>
-            <p:cNvPr id="55" name="Rechtwinkliges Dreieck 54"/>
-            <p:cNvSpPr/>
-            <p:nvPr/>
-          </p:nvSpPr>
-          <p:spPr>
-            <a:xfrm rot="5400000">
-              <a:off x="2486298" y="1817976"/>
-              <a:ext cx="157998" cy="485443"/>
-            </a:xfrm>
-            <a:prstGeom prst="rtTriangle">
-              <a:avLst/>
-            </a:prstGeom>
-            <a:solidFill>
-              <a:schemeClr val="tx1"/>
-            </a:solidFill>
-            <a:ln>
-              <a:noFill/>
-            </a:ln>
-          </p:spPr>
-          <p:style>
-            <a:lnRef idx="2">
-              <a:schemeClr val="accent1">
-                <a:shade val="50000"/>
-              </a:schemeClr>
-            </a:lnRef>
-            <a:fillRef idx="1">
-              <a:schemeClr val="accent1"/>
-            </a:fillRef>
-            <a:effectRef idx="0">
-              <a:schemeClr val="accent1"/>
-            </a:effectRef>
-            <a:fontRef idx="minor">
-              <a:schemeClr val="lt1"/>
-            </a:fontRef>
-          </p:style>
-          <p:txBody>
-            <a:bodyPr rtlCol="0" anchor="ctr"/>
-            <a:lstStyle/>
-            <a:p>
-              <a:pPr algn="ctr"/>
-              <a:endParaRPr lang="de-DE">
-                <a:solidFill>
-                  <a:schemeClr val="tx1">
-                    <a:lumMod val="75000"/>
-                    <a:lumOff val="25000"/>
-                  </a:schemeClr>
-                </a:solidFill>
-              </a:endParaRPr>
-            </a:p>
-          </p:txBody>
-        </p:sp>
-      </p:grpSp>
+              </a:rPr>
+              <a:t>Nachbarn</a:t>
+            </a:r>
+            <a:endParaRPr lang="de-DE" dirty="0">
+              <a:solidFill>
+                <a:schemeClr val="tx1">
+                  <a:lumMod val="75000"/>
+                  <a:lumOff val="25000"/>
+                </a:schemeClr>
+              </a:solidFill>
+              <a:latin typeface="Roboto Light" charset="0"/>
+              <a:ea typeface="Roboto Light" charset="0"/>
+              <a:cs typeface="Roboto Light" charset="0"/>
+            </a:endParaRPr>
+          </a:p>
+        </p:txBody>
+      </p:sp>
       <p:graphicFrame>
         <p:nvGraphicFramePr>
           <p:cNvPr id="22" name="Tabelle 21"/>
@@ -9410,13 +9092,13 @@
           <p:nvPr>
             <p:extLst>
               <p:ext uri="{D42A27DB-BD31-4B8C-83A1-F6EECF244321}">
-                <p14:modId xmlns:p14="http://schemas.microsoft.com/office/powerpoint/2010/main" val="1868902685"/>
+                <p14:modId xmlns:p14="http://schemas.microsoft.com/office/powerpoint/2010/main" val="448851835"/>
               </p:ext>
             </p:extLst>
           </p:nvPr>
         </p:nvGraphicFramePr>
         <p:xfrm>
-          <a:off x="3551353" y="1829560"/>
+          <a:off x="3551353" y="1753360"/>
           <a:ext cx="2888496" cy="648000"/>
         </p:xfrm>
         <a:graphic>
@@ -9461,18 +9143,7 @@
                           <a:ea typeface="Roboto Light" charset="0"/>
                           <a:cs typeface="Roboto Light" charset="0"/>
                         </a:rPr>
-                        <a:t> die </a:t>
-                      </a:r>
-                      <a:r>
-                        <a:rPr lang="de-DE" sz="1100" baseline="0" dirty="0" smtClean="0">
-                          <a:solidFill>
-                            <a:schemeClr val="tx1"/>
-                          </a:solidFill>
-                          <a:latin typeface="Roboto Light" charset="0"/>
-                          <a:ea typeface="Roboto Light" charset="0"/>
-                          <a:cs typeface="Roboto Light" charset="0"/>
-                        </a:rPr>
-                        <a:t>Wohngegend ok?</a:t>
+                        <a:t> die Wohngegend ok?</a:t>
                       </a:r>
                       <a:endParaRPr lang="de-DE" sz="1100" dirty="0">
                         <a:solidFill>
@@ -10222,13 +9893,13 @@
           <p:nvPr>
             <p:extLst>
               <p:ext uri="{D42A27DB-BD31-4B8C-83A1-F6EECF244321}">
-                <p14:modId xmlns:p14="http://schemas.microsoft.com/office/powerpoint/2010/main" val="944301290"/>
+                <p14:modId xmlns:p14="http://schemas.microsoft.com/office/powerpoint/2010/main" val="1890222581"/>
               </p:ext>
             </p:extLst>
           </p:nvPr>
         </p:nvGraphicFramePr>
         <p:xfrm>
-          <a:off x="3551353" y="2557245"/>
+          <a:off x="3551353" y="2481045"/>
           <a:ext cx="2888496" cy="1221840"/>
         </p:xfrm>
         <a:graphic>
@@ -10450,15 +10121,7 @@
                             <a:schemeClr val="tx1"/>
                           </a:solidFill>
                         </a:rPr>
-                        <a:t> </a:t>
-                      </a:r>
-                      <a:r>
-                        <a:rPr lang="de-DE" dirty="0" smtClean="0">
-                          <a:solidFill>
-                            <a:schemeClr val="tx1"/>
-                          </a:solidFill>
-                        </a:rPr>
-                        <a:t>   👍</a:t>
+                        <a:t>    👍</a:t>
                       </a:r>
                       <a:endParaRPr lang="de-DE" dirty="0">
                         <a:solidFill>
@@ -11188,13 +10851,13 @@
           <p:nvPr>
             <p:extLst>
               <p:ext uri="{D42A27DB-BD31-4B8C-83A1-F6EECF244321}">
-                <p14:modId xmlns:p14="http://schemas.microsoft.com/office/powerpoint/2010/main" val="1497347330"/>
+                <p14:modId xmlns:p14="http://schemas.microsoft.com/office/powerpoint/2010/main" val="1245328796"/>
               </p:ext>
             </p:extLst>
           </p:nvPr>
         </p:nvGraphicFramePr>
         <p:xfrm>
-          <a:off x="3544726" y="4421150"/>
+          <a:off x="3544726" y="4268750"/>
           <a:ext cx="2888496" cy="648000"/>
         </p:xfrm>
         <a:graphic>
@@ -11989,13 +11652,13 @@
           <p:nvPr>
             <p:extLst>
               <p:ext uri="{D42A27DB-BD31-4B8C-83A1-F6EECF244321}">
-                <p14:modId xmlns:p14="http://schemas.microsoft.com/office/powerpoint/2010/main" val="1030009410"/>
+                <p14:modId xmlns:p14="http://schemas.microsoft.com/office/powerpoint/2010/main" val="865450710"/>
               </p:ext>
             </p:extLst>
           </p:nvPr>
         </p:nvGraphicFramePr>
         <p:xfrm>
-          <a:off x="3551353" y="5142000"/>
+          <a:off x="3551353" y="4989600"/>
           <a:ext cx="2888496" cy="983280"/>
         </p:xfrm>
         <a:graphic>
@@ -12947,13 +12610,13 @@
           <p:nvPr>
             <p:extLst>
               <p:ext uri="{D42A27DB-BD31-4B8C-83A1-F6EECF244321}">
-                <p14:modId xmlns:p14="http://schemas.microsoft.com/office/powerpoint/2010/main" val="563787958"/>
+                <p14:modId xmlns:p14="http://schemas.microsoft.com/office/powerpoint/2010/main" val="723341839"/>
               </p:ext>
             </p:extLst>
           </p:nvPr>
         </p:nvGraphicFramePr>
         <p:xfrm>
-          <a:off x="3551353" y="7191722"/>
+          <a:off x="3551353" y="7039322"/>
           <a:ext cx="2888496" cy="2301840"/>
         </p:xfrm>
         <a:graphic>
@@ -14789,13 +14452,13 @@
           <p:nvPr>
             <p:extLst>
               <p:ext uri="{D42A27DB-BD31-4B8C-83A1-F6EECF244321}">
-                <p14:modId xmlns:p14="http://schemas.microsoft.com/office/powerpoint/2010/main" val="505435913"/>
+                <p14:modId xmlns:p14="http://schemas.microsoft.com/office/powerpoint/2010/main" val="301362406"/>
               </p:ext>
             </p:extLst>
           </p:nvPr>
         </p:nvGraphicFramePr>
         <p:xfrm>
-          <a:off x="3552677" y="6182956"/>
+          <a:off x="3552677" y="6030556"/>
           <a:ext cx="2888496" cy="983280"/>
         </p:xfrm>
         <a:graphic>
@@ -15758,7 +15421,7 @@
         </p:nvSpPr>
         <p:spPr>
           <a:xfrm>
-            <a:off x="426648" y="8463414"/>
+            <a:off x="426648" y="8387214"/>
             <a:ext cx="2878049" cy="982730"/>
           </a:xfrm>
           <a:prstGeom prst="rect">
@@ -15766,7 +15429,7 @@
           </a:prstGeom>
           <a:solidFill>
             <a:schemeClr val="bg1">
-              <a:lumMod val="85000"/>
+              <a:lumMod val="95000"/>
             </a:schemeClr>
           </a:solidFill>
           <a:ln>
@@ -15848,14 +15511,14 @@
         </p:nvSpPr>
         <p:spPr>
           <a:xfrm>
-            <a:off x="426648" y="8463414"/>
+            <a:off x="426648" y="8387214"/>
             <a:ext cx="45719" cy="982730"/>
           </a:xfrm>
           <a:prstGeom prst="rect">
             <a:avLst/>
           </a:prstGeom>
           <a:solidFill>
-            <a:srgbClr val="F38201"/>
+            <a:srgbClr val="FF0000"/>
           </a:solidFill>
           <a:ln>
             <a:noFill/>
@@ -15895,13 +15558,13 @@
           <p:nvPr>
             <p:extLst>
               <p:ext uri="{D42A27DB-BD31-4B8C-83A1-F6EECF244321}">
-                <p14:modId xmlns:p14="http://schemas.microsoft.com/office/powerpoint/2010/main" val="1608871102"/>
+                <p14:modId xmlns:p14="http://schemas.microsoft.com/office/powerpoint/2010/main" val="1793888961"/>
               </p:ext>
             </p:extLst>
           </p:nvPr>
         </p:nvGraphicFramePr>
         <p:xfrm>
-          <a:off x="558054" y="9141037"/>
+          <a:off x="558054" y="9064837"/>
           <a:ext cx="2635622" cy="205740"/>
         </p:xfrm>
         <a:graphic>
@@ -16100,7 +15763,7 @@
                           <a:ea typeface="Roboto Light" charset="0"/>
                           <a:cs typeface="Roboto Light" charset="0"/>
                         </a:rPr>
-                        <a:t>&gt;18P.</a:t>
+                        <a:t>&gt;18 P.</a:t>
                       </a:r>
                       <a:endParaRPr lang="de-DE" sz="900" dirty="0">
                         <a:solidFill>
@@ -16202,7 +15865,7 @@
                           <a:ea typeface="Roboto Light" charset="0"/>
                           <a:cs typeface="Roboto Light" charset="0"/>
                         </a:rPr>
-                        <a:t>&lt;=18P.</a:t>
+                        <a:t>&lt;=18 P.</a:t>
                       </a:r>
                       <a:endParaRPr lang="de-DE" sz="900" dirty="0">
                         <a:solidFill>
@@ -16251,7 +15914,7 @@
         </p:nvSpPr>
         <p:spPr>
           <a:xfrm>
-            <a:off x="5570193" y="9446144"/>
+            <a:off x="5570193" y="9357244"/>
             <a:ext cx="931665" cy="246221"/>
           </a:xfrm>
           <a:prstGeom prst="rect">
@@ -16281,10 +15944,150 @@
           </a:p>
         </p:txBody>
       </p:sp>
+      <p:cxnSp>
+        <p:nvCxnSpPr>
+          <p:cNvPr id="7" name="Gerade Verbindung 6"/>
+          <p:cNvCxnSpPr/>
+          <p:nvPr/>
+        </p:nvCxnSpPr>
+        <p:spPr>
+          <a:xfrm>
+            <a:off x="426648" y="1562663"/>
+            <a:ext cx="2878049" cy="0"/>
+          </a:xfrm>
+          <a:prstGeom prst="line">
+            <a:avLst/>
+          </a:prstGeom>
+          <a:ln w="31750">
+            <a:solidFill>
+              <a:srgbClr val="50B432"/>
+            </a:solidFill>
+          </a:ln>
+        </p:spPr>
+        <p:style>
+          <a:lnRef idx="1">
+            <a:schemeClr val="accent1"/>
+          </a:lnRef>
+          <a:fillRef idx="0">
+            <a:schemeClr val="accent1"/>
+          </a:fillRef>
+          <a:effectRef idx="0">
+            <a:schemeClr val="accent1"/>
+          </a:effectRef>
+          <a:fontRef idx="minor">
+            <a:schemeClr val="tx1"/>
+          </a:fontRef>
+        </p:style>
+      </p:cxnSp>
+      <p:cxnSp>
+        <p:nvCxnSpPr>
+          <p:cNvPr id="34" name="Gerade Verbindung 33"/>
+          <p:cNvCxnSpPr/>
+          <p:nvPr/>
+        </p:nvCxnSpPr>
+        <p:spPr>
+          <a:xfrm>
+            <a:off x="3559992" y="1559615"/>
+            <a:ext cx="2878049" cy="0"/>
+          </a:xfrm>
+          <a:prstGeom prst="line">
+            <a:avLst/>
+          </a:prstGeom>
+          <a:ln w="31750">
+            <a:solidFill>
+              <a:srgbClr val="B2AB12"/>
+            </a:solidFill>
+          </a:ln>
+        </p:spPr>
+        <p:style>
+          <a:lnRef idx="1">
+            <a:schemeClr val="accent1"/>
+          </a:lnRef>
+          <a:fillRef idx="0">
+            <a:schemeClr val="accent1"/>
+          </a:fillRef>
+          <a:effectRef idx="0">
+            <a:schemeClr val="accent1"/>
+          </a:effectRef>
+          <a:fontRef idx="minor">
+            <a:schemeClr val="tx1"/>
+          </a:fontRef>
+        </p:style>
+      </p:cxnSp>
+      <p:cxnSp>
+        <p:nvCxnSpPr>
+          <p:cNvPr id="35" name="Gerade Verbindung 34"/>
+          <p:cNvCxnSpPr/>
+          <p:nvPr/>
+        </p:nvCxnSpPr>
+        <p:spPr>
+          <a:xfrm>
+            <a:off x="3547800" y="4071167"/>
+            <a:ext cx="2878049" cy="0"/>
+          </a:xfrm>
+          <a:prstGeom prst="line">
+            <a:avLst/>
+          </a:prstGeom>
+          <a:ln w="31750">
+            <a:solidFill>
+              <a:srgbClr val="009CDE"/>
+            </a:solidFill>
+          </a:ln>
+        </p:spPr>
+        <p:style>
+          <a:lnRef idx="1">
+            <a:schemeClr val="accent1"/>
+          </a:lnRef>
+          <a:fillRef idx="0">
+            <a:schemeClr val="accent1"/>
+          </a:fillRef>
+          <a:effectRef idx="0">
+            <a:schemeClr val="accent1"/>
+          </a:effectRef>
+          <a:fontRef idx="minor">
+            <a:schemeClr val="tx1"/>
+          </a:fontRef>
+        </p:style>
+      </p:cxnSp>
+      <p:cxnSp>
+        <p:nvCxnSpPr>
+          <p:cNvPr id="37" name="Gerade Verbindung 36"/>
+          <p:cNvCxnSpPr/>
+          <p:nvPr/>
+        </p:nvCxnSpPr>
+        <p:spPr>
+          <a:xfrm>
+            <a:off x="407021" y="5413300"/>
+            <a:ext cx="2878049" cy="0"/>
+          </a:xfrm>
+          <a:prstGeom prst="line">
+            <a:avLst/>
+          </a:prstGeom>
+          <a:ln w="31750">
+            <a:solidFill>
+              <a:srgbClr val="F38201"/>
+            </a:solidFill>
+          </a:ln>
+        </p:spPr>
+        <p:style>
+          <a:lnRef idx="1">
+            <a:schemeClr val="accent1"/>
+          </a:lnRef>
+          <a:fillRef idx="0">
+            <a:schemeClr val="accent1"/>
+          </a:fillRef>
+          <a:effectRef idx="0">
+            <a:schemeClr val="accent1"/>
+          </a:effectRef>
+          <a:fontRef idx="minor">
+            <a:schemeClr val="tx1"/>
+          </a:fontRef>
+        </p:style>
+      </p:cxnSp>
     </p:spTree>
     <p:extLst>
       <p:ext uri="{BB962C8B-B14F-4D97-AF65-F5344CB8AC3E}">
-        <p14:creationId xmlns:p14="http://schemas.microsoft.com/office/powerpoint/2010/main" val="463607163"/>
+        <p14:creationId xmlns:p14="http://schemas.microsoft.com/office/powerpoint/2010/main" val="209290977"/>
       </p:ext>
     </p:extLst>
   </p:cSld>

</xml_diff>